<commit_message>
update the weekly meeting
</commit_message>
<xml_diff>
--- a/Weekly Meeting.pptx
+++ b/Weekly Meeting.pptx
@@ -5,7 +5,7 @@
     <p:sldMasterId id="2147483648" r:id="rId1"/>
   </p:sldMasterIdLst>
   <p:notesMasterIdLst>
-    <p:notesMasterId r:id="rId35"/>
+    <p:notesMasterId r:id="rId38"/>
   </p:notesMasterIdLst>
   <p:sldIdLst>
     <p:sldId id="256" r:id="rId2"/>
@@ -41,6 +41,9 @@
     <p:sldId id="282" r:id="rId32"/>
     <p:sldId id="279" r:id="rId33"/>
     <p:sldId id="290" r:id="rId34"/>
+    <p:sldId id="291" r:id="rId35"/>
+    <p:sldId id="292" r:id="rId36"/>
+    <p:sldId id="293" r:id="rId37"/>
   </p:sldIdLst>
   <p:sldSz cx="12192000" cy="6858000"/>
   <p:notesSz cx="6858000" cy="9144000"/>
@@ -229,7 +232,7 @@
           <a:p>
             <a:fld id="{C4E34F3E-5E13-4569-AED8-9BE6D7A97527}" type="datetimeFigureOut">
               <a:rPr lang="zh-CN" altLang="en-US" smtClean="0"/>
-              <a:t>2024/6/19</a:t>
+              <a:t>2024/7/28</a:t>
             </a:fld>
             <a:endParaRPr lang="zh-CN" altLang="en-US"/>
           </a:p>
@@ -1325,7 +1328,7 @@
           <a:p>
             <a:fld id="{7FC1EC50-D9D9-4E38-915B-B925165D12F3}" type="datetimeFigureOut">
               <a:rPr lang="zh-CN" altLang="en-US" smtClean="0"/>
-              <a:t>2024/6/19</a:t>
+              <a:t>2024/7/28</a:t>
             </a:fld>
             <a:endParaRPr lang="zh-CN" altLang="en-US"/>
           </a:p>
@@ -1523,7 +1526,7 @@
           <a:p>
             <a:fld id="{7FC1EC50-D9D9-4E38-915B-B925165D12F3}" type="datetimeFigureOut">
               <a:rPr lang="zh-CN" altLang="en-US" smtClean="0"/>
-              <a:t>2024/6/19</a:t>
+              <a:t>2024/7/28</a:t>
             </a:fld>
             <a:endParaRPr lang="zh-CN" altLang="en-US"/>
           </a:p>
@@ -1731,7 +1734,7 @@
           <a:p>
             <a:fld id="{7FC1EC50-D9D9-4E38-915B-B925165D12F3}" type="datetimeFigureOut">
               <a:rPr lang="zh-CN" altLang="en-US" smtClean="0"/>
-              <a:t>2024/6/19</a:t>
+              <a:t>2024/7/28</a:t>
             </a:fld>
             <a:endParaRPr lang="zh-CN" altLang="en-US"/>
           </a:p>
@@ -1929,7 +1932,7 @@
           <a:p>
             <a:fld id="{7FC1EC50-D9D9-4E38-915B-B925165D12F3}" type="datetimeFigureOut">
               <a:rPr lang="zh-CN" altLang="en-US" smtClean="0"/>
-              <a:t>2024/6/19</a:t>
+              <a:t>2024/7/28</a:t>
             </a:fld>
             <a:endParaRPr lang="zh-CN" altLang="en-US"/>
           </a:p>
@@ -2204,7 +2207,7 @@
           <a:p>
             <a:fld id="{7FC1EC50-D9D9-4E38-915B-B925165D12F3}" type="datetimeFigureOut">
               <a:rPr lang="zh-CN" altLang="en-US" smtClean="0"/>
-              <a:t>2024/6/19</a:t>
+              <a:t>2024/7/28</a:t>
             </a:fld>
             <a:endParaRPr lang="zh-CN" altLang="en-US"/>
           </a:p>
@@ -2469,7 +2472,7 @@
           <a:p>
             <a:fld id="{7FC1EC50-D9D9-4E38-915B-B925165D12F3}" type="datetimeFigureOut">
               <a:rPr lang="zh-CN" altLang="en-US" smtClean="0"/>
-              <a:t>2024/6/19</a:t>
+              <a:t>2024/7/28</a:t>
             </a:fld>
             <a:endParaRPr lang="zh-CN" altLang="en-US"/>
           </a:p>
@@ -2881,7 +2884,7 @@
           <a:p>
             <a:fld id="{7FC1EC50-D9D9-4E38-915B-B925165D12F3}" type="datetimeFigureOut">
               <a:rPr lang="zh-CN" altLang="en-US" smtClean="0"/>
-              <a:t>2024/6/19</a:t>
+              <a:t>2024/7/28</a:t>
             </a:fld>
             <a:endParaRPr lang="zh-CN" altLang="en-US"/>
           </a:p>
@@ -3022,7 +3025,7 @@
           <a:p>
             <a:fld id="{7FC1EC50-D9D9-4E38-915B-B925165D12F3}" type="datetimeFigureOut">
               <a:rPr lang="zh-CN" altLang="en-US" smtClean="0"/>
-              <a:t>2024/6/19</a:t>
+              <a:t>2024/7/28</a:t>
             </a:fld>
             <a:endParaRPr lang="zh-CN" altLang="en-US"/>
           </a:p>
@@ -3135,7 +3138,7 @@
           <a:p>
             <a:fld id="{7FC1EC50-D9D9-4E38-915B-B925165D12F3}" type="datetimeFigureOut">
               <a:rPr lang="zh-CN" altLang="en-US" smtClean="0"/>
-              <a:t>2024/6/19</a:t>
+              <a:t>2024/7/28</a:t>
             </a:fld>
             <a:endParaRPr lang="zh-CN" altLang="en-US"/>
           </a:p>
@@ -3446,7 +3449,7 @@
           <a:p>
             <a:fld id="{7FC1EC50-D9D9-4E38-915B-B925165D12F3}" type="datetimeFigureOut">
               <a:rPr lang="zh-CN" altLang="en-US" smtClean="0"/>
-              <a:t>2024/6/19</a:t>
+              <a:t>2024/7/28</a:t>
             </a:fld>
             <a:endParaRPr lang="zh-CN" altLang="en-US"/>
           </a:p>
@@ -3734,7 +3737,7 @@
           <a:p>
             <a:fld id="{7FC1EC50-D9D9-4E38-915B-B925165D12F3}" type="datetimeFigureOut">
               <a:rPr lang="zh-CN" altLang="en-US" smtClean="0"/>
-              <a:t>2024/6/19</a:t>
+              <a:t>2024/7/28</a:t>
             </a:fld>
             <a:endParaRPr lang="zh-CN" altLang="en-US"/>
           </a:p>
@@ -3975,7 +3978,7 @@
           <a:p>
             <a:fld id="{7FC1EC50-D9D9-4E38-915B-B925165D12F3}" type="datetimeFigureOut">
               <a:rPr lang="zh-CN" altLang="en-US" smtClean="0"/>
-              <a:t>2024/6/19</a:t>
+              <a:t>2024/7/28</a:t>
             </a:fld>
             <a:endParaRPr lang="zh-CN" altLang="en-US"/>
           </a:p>
@@ -16045,6 +16048,380 @@
     <p:extLst>
       <p:ext uri="{BB962C8B-B14F-4D97-AF65-F5344CB8AC3E}">
         <p14:creationId xmlns:p14="http://schemas.microsoft.com/office/powerpoint/2010/main" val="4139878187"/>
+      </p:ext>
+    </p:extLst>
+  </p:cSld>
+  <p:clrMapOvr>
+    <a:masterClrMapping/>
+  </p:clrMapOvr>
+</p:sld>
+</file>
+
+<file path=ppt/slides/slide34.xml><?xml version="1.0" encoding="utf-8"?>
+<p:sld xmlns:a="http://schemas.openxmlformats.org/drawingml/2006/main" xmlns:r="http://schemas.openxmlformats.org/officeDocument/2006/relationships" xmlns:p="http://schemas.openxmlformats.org/presentationml/2006/main">
+  <p:cSld>
+    <p:spTree>
+      <p:nvGrpSpPr>
+        <p:cNvPr id="1" name=""/>
+        <p:cNvGrpSpPr/>
+        <p:nvPr/>
+      </p:nvGrpSpPr>
+      <p:grpSpPr>
+        <a:xfrm>
+          <a:off x="0" y="0"/>
+          <a:ext cx="0" cy="0"/>
+          <a:chOff x="0" y="0"/>
+          <a:chExt cx="0" cy="0"/>
+        </a:xfrm>
+      </p:grpSpPr>
+      <p:sp>
+        <p:nvSpPr>
+          <p:cNvPr id="2" name="标题 1">
+            <a:extLst>
+              <a:ext uri="{FF2B5EF4-FFF2-40B4-BE49-F238E27FC236}">
+                <a16:creationId xmlns:a16="http://schemas.microsoft.com/office/drawing/2014/main" id="{9794A455-9698-02D6-60B7-FC2B2E0371FF}"/>
+              </a:ext>
+            </a:extLst>
+          </p:cNvPr>
+          <p:cNvSpPr>
+            <a:spLocks noGrp="1"/>
+          </p:cNvSpPr>
+          <p:nvPr>
+            <p:ph type="title"/>
+          </p:nvPr>
+        </p:nvSpPr>
+        <p:spPr/>
+        <p:txBody>
+          <a:bodyPr/>
+          <a:lstStyle/>
+          <a:p>
+            <a:r>
+              <a:rPr lang="en-US" altLang="zh-CN" dirty="0"/>
+              <a:t>7/28</a:t>
+            </a:r>
+            <a:endParaRPr lang="zh-CN" altLang="en-US" dirty="0"/>
+          </a:p>
+        </p:txBody>
+      </p:sp>
+      <p:sp>
+        <p:nvSpPr>
+          <p:cNvPr id="3" name="内容占位符 2">
+            <a:extLst>
+              <a:ext uri="{FF2B5EF4-FFF2-40B4-BE49-F238E27FC236}">
+                <a16:creationId xmlns:a16="http://schemas.microsoft.com/office/drawing/2014/main" id="{6ABE23AC-6343-2743-05DF-7A01A87231D8}"/>
+              </a:ext>
+            </a:extLst>
+          </p:cNvPr>
+          <p:cNvSpPr>
+            <a:spLocks noGrp="1"/>
+          </p:cNvSpPr>
+          <p:nvPr>
+            <p:ph idx="1"/>
+          </p:nvPr>
+        </p:nvSpPr>
+        <p:spPr/>
+        <p:txBody>
+          <a:bodyPr/>
+          <a:lstStyle/>
+          <a:p>
+            <a:endParaRPr lang="zh-CN" altLang="en-US" dirty="0"/>
+          </a:p>
+        </p:txBody>
+      </p:sp>
+    </p:spTree>
+    <p:extLst>
+      <p:ext uri="{BB962C8B-B14F-4D97-AF65-F5344CB8AC3E}">
+        <p14:creationId xmlns:p14="http://schemas.microsoft.com/office/powerpoint/2010/main" val="3340184597"/>
+      </p:ext>
+    </p:extLst>
+  </p:cSld>
+  <p:clrMapOvr>
+    <a:masterClrMapping/>
+  </p:clrMapOvr>
+</p:sld>
+</file>
+
+<file path=ppt/slides/slide35.xml><?xml version="1.0" encoding="utf-8"?>
+<p:sld xmlns:a="http://schemas.openxmlformats.org/drawingml/2006/main" xmlns:r="http://schemas.openxmlformats.org/officeDocument/2006/relationships" xmlns:p="http://schemas.openxmlformats.org/presentationml/2006/main">
+  <p:cSld>
+    <p:spTree>
+      <p:nvGrpSpPr>
+        <p:cNvPr id="1" name=""/>
+        <p:cNvGrpSpPr/>
+        <p:nvPr/>
+      </p:nvGrpSpPr>
+      <p:grpSpPr>
+        <a:xfrm>
+          <a:off x="0" y="0"/>
+          <a:ext cx="0" cy="0"/>
+          <a:chOff x="0" y="0"/>
+          <a:chExt cx="0" cy="0"/>
+        </a:xfrm>
+      </p:grpSpPr>
+      <p:sp>
+        <p:nvSpPr>
+          <p:cNvPr id="2" name="标题 1">
+            <a:extLst>
+              <a:ext uri="{FF2B5EF4-FFF2-40B4-BE49-F238E27FC236}">
+                <a16:creationId xmlns:a16="http://schemas.microsoft.com/office/drawing/2014/main" id="{90688FC9-2390-4B4E-F336-855C0AAF85F7}"/>
+              </a:ext>
+            </a:extLst>
+          </p:cNvPr>
+          <p:cNvSpPr>
+            <a:spLocks noGrp="1"/>
+          </p:cNvSpPr>
+          <p:nvPr>
+            <p:ph type="title"/>
+          </p:nvPr>
+        </p:nvSpPr>
+        <p:spPr/>
+        <p:txBody>
+          <a:bodyPr/>
+          <a:lstStyle/>
+          <a:p>
+            <a:r>
+              <a:rPr lang="en-US" altLang="zh-CN" dirty="0"/>
+              <a:t>Preprocessing </a:t>
+            </a:r>
+            <a:endParaRPr lang="zh-CN" altLang="en-US" dirty="0"/>
+          </a:p>
+        </p:txBody>
+      </p:sp>
+      <p:sp>
+        <p:nvSpPr>
+          <p:cNvPr id="3" name="内容占位符 2">
+            <a:extLst>
+              <a:ext uri="{FF2B5EF4-FFF2-40B4-BE49-F238E27FC236}">
+                <a16:creationId xmlns:a16="http://schemas.microsoft.com/office/drawing/2014/main" id="{C93AAB9E-4E80-85DA-1F66-DDA9D9B8DFC4}"/>
+              </a:ext>
+            </a:extLst>
+          </p:cNvPr>
+          <p:cNvSpPr>
+            <a:spLocks noGrp="1"/>
+          </p:cNvSpPr>
+          <p:nvPr>
+            <p:ph idx="1"/>
+          </p:nvPr>
+        </p:nvSpPr>
+        <p:spPr/>
+        <p:txBody>
+          <a:bodyPr/>
+          <a:lstStyle/>
+          <a:p>
+            <a:r>
+              <a:rPr lang="en-US" altLang="zh-CN" dirty="0"/>
+              <a:t>Dataset problem </a:t>
+            </a:r>
+          </a:p>
+          <a:p>
+            <a:pPr lvl="1"/>
+            <a:r>
+              <a:rPr lang="en-US" altLang="zh-CN" dirty="0"/>
+              <a:t>Check the original image</a:t>
+            </a:r>
+          </a:p>
+          <a:p>
+            <a:pPr lvl="1"/>
+            <a:r>
+              <a:rPr lang="en-US" altLang="zh-CN" dirty="0"/>
+              <a:t>Check the preprocess step by step</a:t>
+            </a:r>
+          </a:p>
+          <a:p>
+            <a:pPr lvl="2"/>
+            <a:r>
+              <a:rPr lang="en-US" altLang="zh-CN" dirty="0"/>
+              <a:t>Trying to duplicate Olayinka's script</a:t>
+            </a:r>
+          </a:p>
+          <a:p>
+            <a:pPr lvl="3"/>
+            <a:r>
+              <a:rPr lang="en-US" altLang="zh-CN" dirty="0"/>
+              <a:t>Resize, change orientation</a:t>
+            </a:r>
+          </a:p>
+          <a:p>
+            <a:pPr lvl="3"/>
+            <a:r>
+              <a:rPr lang="en-US" altLang="zh-CN" dirty="0"/>
+              <a:t>Bias Field Correction</a:t>
+            </a:r>
+          </a:p>
+          <a:p>
+            <a:pPr lvl="3"/>
+            <a:r>
+              <a:rPr lang="en-US" altLang="zh-CN" dirty="0"/>
+              <a:t>Brain Extraction</a:t>
+            </a:r>
+          </a:p>
+          <a:p>
+            <a:pPr lvl="3"/>
+            <a:r>
+              <a:rPr lang="en-US" altLang="zh-CN" dirty="0"/>
+              <a:t>MNI Alignment</a:t>
+            </a:r>
+          </a:p>
+          <a:p>
+            <a:pPr lvl="2"/>
+            <a:r>
+              <a:rPr lang="en-US" altLang="zh-CN" dirty="0"/>
+              <a:t>My preprocessing before input training</a:t>
+            </a:r>
+          </a:p>
+          <a:p>
+            <a:pPr lvl="3"/>
+            <a:r>
+              <a:rPr lang="en-US" altLang="zh-CN" dirty="0"/>
+              <a:t>Data augmentation </a:t>
+            </a:r>
+          </a:p>
+          <a:p>
+            <a:pPr lvl="3"/>
+            <a:r>
+              <a:rPr lang="en-US" altLang="zh-CN" dirty="0" err="1"/>
+              <a:t>Upsampling</a:t>
+            </a:r>
+            <a:r>
+              <a:rPr lang="en-US" altLang="zh-CN" dirty="0"/>
+              <a:t> </a:t>
+            </a:r>
+          </a:p>
+          <a:p>
+            <a:pPr lvl="1"/>
+            <a:r>
+              <a:rPr lang="en-US" altLang="zh-CN" dirty="0"/>
+              <a:t>Understand what will each preprocess gone affect the training</a:t>
+            </a:r>
+          </a:p>
+          <a:p>
+            <a:pPr lvl="2"/>
+            <a:endParaRPr lang="zh-CN" altLang="en-US" dirty="0"/>
+          </a:p>
+        </p:txBody>
+      </p:sp>
+    </p:spTree>
+    <p:extLst>
+      <p:ext uri="{BB962C8B-B14F-4D97-AF65-F5344CB8AC3E}">
+        <p14:creationId xmlns:p14="http://schemas.microsoft.com/office/powerpoint/2010/main" val="3256955636"/>
+      </p:ext>
+    </p:extLst>
+  </p:cSld>
+  <p:clrMapOvr>
+    <a:masterClrMapping/>
+  </p:clrMapOvr>
+</p:sld>
+</file>
+
+<file path=ppt/slides/slide36.xml><?xml version="1.0" encoding="utf-8"?>
+<p:sld xmlns:a="http://schemas.openxmlformats.org/drawingml/2006/main" xmlns:r="http://schemas.openxmlformats.org/officeDocument/2006/relationships" xmlns:p="http://schemas.openxmlformats.org/presentationml/2006/main">
+  <p:cSld>
+    <p:spTree>
+      <p:nvGrpSpPr>
+        <p:cNvPr id="1" name=""/>
+        <p:cNvGrpSpPr/>
+        <p:nvPr/>
+      </p:nvGrpSpPr>
+      <p:grpSpPr>
+        <a:xfrm>
+          <a:off x="0" y="0"/>
+          <a:ext cx="0" cy="0"/>
+          <a:chOff x="0" y="0"/>
+          <a:chExt cx="0" cy="0"/>
+        </a:xfrm>
+      </p:grpSpPr>
+      <p:sp>
+        <p:nvSpPr>
+          <p:cNvPr id="2" name="标题 1">
+            <a:extLst>
+              <a:ext uri="{FF2B5EF4-FFF2-40B4-BE49-F238E27FC236}">
+                <a16:creationId xmlns:a16="http://schemas.microsoft.com/office/drawing/2014/main" id="{7EF5DAB0-374F-821A-F121-7AF2742E0CF0}"/>
+              </a:ext>
+            </a:extLst>
+          </p:cNvPr>
+          <p:cNvSpPr>
+            <a:spLocks noGrp="1"/>
+          </p:cNvSpPr>
+          <p:nvPr>
+            <p:ph type="title"/>
+          </p:nvPr>
+        </p:nvSpPr>
+        <p:spPr/>
+        <p:txBody>
+          <a:bodyPr/>
+          <a:lstStyle/>
+          <a:p>
+            <a:r>
+              <a:rPr lang="en-US" altLang="zh-CN" dirty="0"/>
+              <a:t>Training </a:t>
+            </a:r>
+            <a:endParaRPr lang="zh-CN" altLang="en-US" dirty="0"/>
+          </a:p>
+        </p:txBody>
+      </p:sp>
+      <p:sp>
+        <p:nvSpPr>
+          <p:cNvPr id="3" name="内容占位符 2">
+            <a:extLst>
+              <a:ext uri="{FF2B5EF4-FFF2-40B4-BE49-F238E27FC236}">
+                <a16:creationId xmlns:a16="http://schemas.microsoft.com/office/drawing/2014/main" id="{2D794D00-D0C5-4F43-9AC3-4DE84D19E5C1}"/>
+              </a:ext>
+            </a:extLst>
+          </p:cNvPr>
+          <p:cNvSpPr>
+            <a:spLocks noGrp="1"/>
+          </p:cNvSpPr>
+          <p:nvPr>
+            <p:ph idx="1"/>
+          </p:nvPr>
+        </p:nvSpPr>
+        <p:spPr/>
+        <p:txBody>
+          <a:bodyPr/>
+          <a:lstStyle/>
+          <a:p>
+            <a:r>
+              <a:rPr lang="en-US" altLang="zh-CN" dirty="0"/>
+              <a:t>Tracing the patient and index of slices</a:t>
+            </a:r>
+          </a:p>
+          <a:p>
+            <a:pPr lvl="1"/>
+            <a:r>
+              <a:rPr lang="en-US" altLang="zh-CN" dirty="0"/>
+              <a:t>Accuracy vs each patient</a:t>
+            </a:r>
+          </a:p>
+          <a:p>
+            <a:pPr lvl="1"/>
+            <a:r>
+              <a:rPr lang="en-US" altLang="zh-CN" dirty="0"/>
+              <a:t>Accuracy vs each number of slices</a:t>
+            </a:r>
+          </a:p>
+          <a:p>
+            <a:pPr lvl="1"/>
+            <a:endParaRPr lang="en-US" altLang="zh-CN" dirty="0"/>
+          </a:p>
+          <a:p>
+            <a:pPr lvl="1"/>
+            <a:endParaRPr lang="en-US" altLang="zh-CN" dirty="0"/>
+          </a:p>
+          <a:p>
+            <a:r>
+              <a:rPr lang="en-US" altLang="zh-CN" dirty="0"/>
+              <a:t>Detect whether there is a feature which can be used for predict</a:t>
+            </a:r>
+          </a:p>
+          <a:p>
+            <a:endParaRPr lang="en-US" altLang="zh-CN" dirty="0"/>
+          </a:p>
+        </p:txBody>
+      </p:sp>
+    </p:spTree>
+    <p:extLst>
+      <p:ext uri="{BB962C8B-B14F-4D97-AF65-F5344CB8AC3E}">
+        <p14:creationId xmlns:p14="http://schemas.microsoft.com/office/powerpoint/2010/main" val="1240118719"/>
       </p:ext>
     </p:extLst>
   </p:cSld>

</xml_diff>